<commit_message>
updated model_2, updated tweets-ann-balanced
</commit_message>
<xml_diff>
--- a/Group 4 Presentation.pptx
+++ b/Group 4 Presentation.pptx
@@ -38,7 +38,8 @@
     <p:sldId id="286" r:id="rId32"/>
     <p:sldId id="287" r:id="rId33"/>
     <p:sldId id="288" r:id="rId34"/>
-    <p:sldId id="289" r:id="rId35"/>
+    <p:sldId id="290" r:id="rId35"/>
+    <p:sldId id="289" r:id="rId36"/>
   </p:sldIdLst>
   <p:sldSz cx="12192000" cy="6858000"/>
   <p:notesSz cx="6858000" cy="9144000"/>
@@ -137,6 +138,11 @@
       </a:defRPr>
     </a:lvl9pPr>
   </p:defaultTextStyle>
+  <p:extLst>
+    <p:ext uri="{EFAFB233-063F-42B5-8137-9DF3F51BA10A}">
+      <p15:sldGuideLst xmlns:p15="http://schemas.microsoft.com/office/powerpoint/2012/main"/>
+    </p:ext>
+  </p:extLst>
 </p:presentation>
 </file>
 
@@ -18972,10 +18978,10 @@
       </p:sp>
       <p:pic>
         <p:nvPicPr>
-          <p:cNvPr id="4" name="Picture 3">
+          <p:cNvPr id="5" name="Picture 4">
             <a:extLst>
               <a:ext uri="{FF2B5EF4-FFF2-40B4-BE49-F238E27FC236}">
-                <a16:creationId xmlns:a16="http://schemas.microsoft.com/office/drawing/2014/main" id="{A985E703-163B-6889-71AC-02931B5CF230}"/>
+                <a16:creationId xmlns:a16="http://schemas.microsoft.com/office/drawing/2014/main" id="{753BC121-94FB-6A8F-0F71-1AB76D7F3FDF}"/>
               </a:ext>
             </a:extLst>
           </p:cNvPr>
@@ -18992,8 +18998,8 @@
         </p:blipFill>
         <p:spPr>
           <a:xfrm>
-            <a:off x="4670443" y="102986"/>
-            <a:ext cx="6427901" cy="6652026"/>
+            <a:off x="4851802" y="78836"/>
+            <a:ext cx="6559147" cy="6730805"/>
           </a:xfrm>
           <a:prstGeom prst="rect">
             <a:avLst/>
@@ -19014,6 +19020,755 @@
 </file>
 
 <file path=ppt/slides/slide34.xml><?xml version="1.0" encoding="utf-8"?>
+<p:sld xmlns:a="http://schemas.openxmlformats.org/drawingml/2006/main" xmlns:r="http://schemas.openxmlformats.org/officeDocument/2006/relationships" xmlns:p="http://schemas.openxmlformats.org/presentationml/2006/main">
+  <p:cSld>
+    <p:bg>
+      <p:bgPr>
+        <a:solidFill>
+          <a:schemeClr val="bg1"/>
+        </a:solidFill>
+        <a:effectLst/>
+      </p:bgPr>
+    </p:bg>
+    <p:spTree>
+      <p:nvGrpSpPr>
+        <p:cNvPr id="1" name=""/>
+        <p:cNvGrpSpPr/>
+        <p:nvPr/>
+      </p:nvGrpSpPr>
+      <p:grpSpPr>
+        <a:xfrm>
+          <a:off x="0" y="0"/>
+          <a:ext cx="0" cy="0"/>
+          <a:chOff x="0" y="0"/>
+          <a:chExt cx="0" cy="0"/>
+        </a:xfrm>
+      </p:grpSpPr>
+      <p:sp>
+        <p:nvSpPr>
+          <p:cNvPr id="7" name="Rectangle 9">
+            <a:extLst>
+              <a:ext uri="{FF2B5EF4-FFF2-40B4-BE49-F238E27FC236}">
+                <a16:creationId xmlns:a16="http://schemas.microsoft.com/office/drawing/2014/main" id="{BD4C0BBB-0042-4603-A226-6117F3FD5B3C}"/>
+              </a:ext>
+              <a:ext uri="{C183D7F6-B498-43B3-948B-1728B52AA6E4}">
+                <adec:decorative xmlns:adec="http://schemas.microsoft.com/office/drawing/2017/decorative" val="1"/>
+              </a:ext>
+            </a:extLst>
+          </p:cNvPr>
+          <p:cNvSpPr>
+            <a:spLocks noGrp="1" noRot="1" noChangeAspect="1" noMove="1" noResize="1" noEditPoints="1" noAdjustHandles="1" noChangeArrowheads="1" noChangeShapeType="1" noTextEdit="1"/>
+          </p:cNvSpPr>
+          <p:nvPr>
+            <p:extLst>
+              <p:ext uri="{386F3935-93C4-4BCD-93E2-E3B085C9AB24}">
+                <p16:designElem xmlns:p16="http://schemas.microsoft.com/office/powerpoint/2015/main" val="1"/>
+              </p:ext>
+            </p:extLst>
+          </p:nvPr>
+        </p:nvSpPr>
+        <p:spPr>
+          <a:xfrm rot="10800000" flipH="1">
+            <a:off x="0" y="6400799"/>
+            <a:ext cx="12192000" cy="456773"/>
+          </a:xfrm>
+          <a:prstGeom prst="rect">
+            <a:avLst/>
+          </a:prstGeom>
+          <a:gradFill>
+            <a:gsLst>
+              <a:gs pos="14000">
+                <a:schemeClr val="accent4">
+                  <a:alpha val="28000"/>
+                </a:schemeClr>
+              </a:gs>
+              <a:gs pos="100000">
+                <a:schemeClr val="accent5">
+                  <a:alpha val="85000"/>
+                </a:schemeClr>
+              </a:gs>
+            </a:gsLst>
+            <a:lin ang="6000000" scaled="0"/>
+          </a:gradFill>
+          <a:ln>
+            <a:noFill/>
+          </a:ln>
+        </p:spPr>
+        <p:style>
+          <a:lnRef idx="2">
+            <a:schemeClr val="accent1">
+              <a:shade val="50000"/>
+            </a:schemeClr>
+          </a:lnRef>
+          <a:fillRef idx="1">
+            <a:schemeClr val="accent1"/>
+          </a:fillRef>
+          <a:effectRef idx="0">
+            <a:schemeClr val="accent1"/>
+          </a:effectRef>
+          <a:fontRef idx="minor">
+            <a:schemeClr val="lt1"/>
+          </a:fontRef>
+        </p:style>
+        <p:txBody>
+          <a:bodyPr rtlCol="0" anchor="ctr"/>
+          <a:lstStyle/>
+          <a:p>
+            <a:pPr algn="ctr"/>
+            <a:endParaRPr lang="en-US"/>
+          </a:p>
+        </p:txBody>
+      </p:sp>
+      <p:sp>
+        <p:nvSpPr>
+          <p:cNvPr id="8" name="Rectangle 11">
+            <a:extLst>
+              <a:ext uri="{FF2B5EF4-FFF2-40B4-BE49-F238E27FC236}">
+                <a16:creationId xmlns:a16="http://schemas.microsoft.com/office/drawing/2014/main" id="{EC44F520-2598-460E-9F91-B02F60830CA2}"/>
+              </a:ext>
+              <a:ext uri="{C183D7F6-B498-43B3-948B-1728B52AA6E4}">
+                <adec:decorative xmlns:adec="http://schemas.microsoft.com/office/drawing/2017/decorative" val="1"/>
+              </a:ext>
+            </a:extLst>
+          </p:cNvPr>
+          <p:cNvSpPr>
+            <a:spLocks noGrp="1" noRot="1" noChangeAspect="1" noMove="1" noResize="1" noEditPoints="1" noAdjustHandles="1" noChangeArrowheads="1" noChangeShapeType="1" noTextEdit="1"/>
+          </p:cNvSpPr>
+          <p:nvPr>
+            <p:extLst>
+              <p:ext uri="{386F3935-93C4-4BCD-93E2-E3B085C9AB24}">
+                <p16:designElem xmlns:p16="http://schemas.microsoft.com/office/powerpoint/2015/main" val="1"/>
+              </p:ext>
+            </p:extLst>
+          </p:nvPr>
+        </p:nvSpPr>
+        <p:spPr>
+          <a:xfrm flipH="1">
+            <a:off x="4038600" y="6400799"/>
+            <a:ext cx="8153398" cy="456772"/>
+          </a:xfrm>
+          <a:prstGeom prst="rect">
+            <a:avLst/>
+          </a:prstGeom>
+          <a:gradFill>
+            <a:gsLst>
+              <a:gs pos="9000">
+                <a:schemeClr val="accent2">
+                  <a:lumMod val="60000"/>
+                  <a:lumOff val="40000"/>
+                  <a:alpha val="55000"/>
+                </a:schemeClr>
+              </a:gs>
+              <a:gs pos="99000">
+                <a:schemeClr val="accent2"/>
+              </a:gs>
+            </a:gsLst>
+            <a:lin ang="14400000" scaled="0"/>
+          </a:gradFill>
+          <a:ln>
+            <a:noFill/>
+          </a:ln>
+        </p:spPr>
+        <p:style>
+          <a:lnRef idx="2">
+            <a:schemeClr val="accent1">
+              <a:shade val="50000"/>
+            </a:schemeClr>
+          </a:lnRef>
+          <a:fillRef idx="1">
+            <a:schemeClr val="accent1"/>
+          </a:fillRef>
+          <a:effectRef idx="0">
+            <a:schemeClr val="accent1"/>
+          </a:effectRef>
+          <a:fontRef idx="minor">
+            <a:schemeClr val="lt1"/>
+          </a:fontRef>
+        </p:style>
+        <p:txBody>
+          <a:bodyPr rtlCol="0" anchor="ctr"/>
+          <a:lstStyle/>
+          <a:p>
+            <a:pPr algn="ctr"/>
+            <a:endParaRPr lang="en-US"/>
+          </a:p>
+        </p:txBody>
+      </p:sp>
+      <p:sp useBgFill="1">
+        <p:nvSpPr>
+          <p:cNvPr id="9" name="Rectangle 13">
+            <a:extLst>
+              <a:ext uri="{FF2B5EF4-FFF2-40B4-BE49-F238E27FC236}">
+                <a16:creationId xmlns:a16="http://schemas.microsoft.com/office/drawing/2014/main" id="{1DBC8414-BE7E-4B6C-A114-B2C3795C883F}"/>
+              </a:ext>
+              <a:ext uri="{C183D7F6-B498-43B3-948B-1728B52AA6E4}">
+                <adec:decorative xmlns:adec="http://schemas.microsoft.com/office/drawing/2017/decorative" val="1"/>
+              </a:ext>
+            </a:extLst>
+          </p:cNvPr>
+          <p:cNvSpPr>
+            <a:spLocks noGrp="1" noRot="1" noChangeAspect="1" noMove="1" noResize="1" noEditPoints="1" noAdjustHandles="1" noChangeArrowheads="1" noChangeShapeType="1" noTextEdit="1"/>
+          </p:cNvSpPr>
+          <p:nvPr>
+            <p:extLst>
+              <p:ext uri="{386F3935-93C4-4BCD-93E2-E3B085C9AB24}">
+                <p16:designElem xmlns:p16="http://schemas.microsoft.com/office/powerpoint/2015/main" val="1"/>
+              </p:ext>
+            </p:extLst>
+          </p:nvPr>
+        </p:nvSpPr>
+        <p:spPr>
+          <a:xfrm>
+            <a:off x="0" y="0"/>
+            <a:ext cx="12192000" cy="6858000"/>
+          </a:xfrm>
+          <a:prstGeom prst="rect">
+            <a:avLst/>
+          </a:prstGeom>
+          <a:ln w="12700" cap="flat" cmpd="sng" algn="ctr">
+            <a:noFill/>
+            <a:prstDash val="solid"/>
+            <a:miter lim="800000"/>
+          </a:ln>
+          <a:effectLst/>
+          <a:extLst>
+            <a:ext uri="{91240B29-F687-4F45-9708-019B960494DF}">
+              <a14:hiddenLine xmlns:a14="http://schemas.microsoft.com/office/drawing/2010/main" w="12700" cap="flat" cmpd="sng" algn="ctr">
+                <a:solidFill>
+                  <a:schemeClr val="accent1">
+                    <a:shade val="50000"/>
+                  </a:schemeClr>
+                </a:solidFill>
+                <a:prstDash val="solid"/>
+                <a:miter lim="800000"/>
+              </a14:hiddenLine>
+            </a:ext>
+          </a:extLst>
+        </p:spPr>
+        <p:style>
+          <a:lnRef idx="2">
+            <a:schemeClr val="accent1">
+              <a:shade val="50000"/>
+            </a:schemeClr>
+          </a:lnRef>
+          <a:fillRef idx="1">
+            <a:schemeClr val="accent1"/>
+          </a:fillRef>
+          <a:effectRef idx="0">
+            <a:schemeClr val="accent1"/>
+          </a:effectRef>
+          <a:fontRef idx="minor">
+            <a:schemeClr val="lt1"/>
+          </a:fontRef>
+        </p:style>
+        <p:txBody>
+          <a:bodyPr rtlCol="0" anchor="ctr"/>
+          <a:lstStyle/>
+          <a:p>
+            <a:pPr algn="ctr"/>
+            <a:endParaRPr lang="en-US"/>
+          </a:p>
+        </p:txBody>
+      </p:sp>
+      <p:sp>
+        <p:nvSpPr>
+          <p:cNvPr id="11" name="Rectangle 15">
+            <a:extLst>
+              <a:ext uri="{FF2B5EF4-FFF2-40B4-BE49-F238E27FC236}">
+                <a16:creationId xmlns:a16="http://schemas.microsoft.com/office/drawing/2014/main" id="{0EC398C5-5C2E-4038-9DB3-DE2B5A9BEFFB}"/>
+              </a:ext>
+              <a:ext uri="{C183D7F6-B498-43B3-948B-1728B52AA6E4}">
+                <adec:decorative xmlns:adec="http://schemas.microsoft.com/office/drawing/2017/decorative" val="1"/>
+              </a:ext>
+            </a:extLst>
+          </p:cNvPr>
+          <p:cNvSpPr>
+            <a:spLocks noGrp="1" noRot="1" noChangeAspect="1" noMove="1" noResize="1" noEditPoints="1" noAdjustHandles="1" noChangeArrowheads="1" noChangeShapeType="1" noTextEdit="1"/>
+          </p:cNvSpPr>
+          <p:nvPr>
+            <p:extLst>
+              <p:ext uri="{386F3935-93C4-4BCD-93E2-E3B085C9AB24}">
+                <p16:designElem xmlns:p16="http://schemas.microsoft.com/office/powerpoint/2015/main" val="1"/>
+              </p:ext>
+            </p:extLst>
+          </p:nvPr>
+        </p:nvSpPr>
+        <p:spPr>
+          <a:xfrm rot="5400000" flipH="1">
+            <a:off x="-1409318" y="1410082"/>
+            <a:ext cx="6858000" cy="4037835"/>
+          </a:xfrm>
+          <a:prstGeom prst="rect">
+            <a:avLst/>
+          </a:prstGeom>
+          <a:gradFill>
+            <a:gsLst>
+              <a:gs pos="8000">
+                <a:schemeClr val="accent6"/>
+              </a:gs>
+              <a:gs pos="100000">
+                <a:schemeClr val="accent5">
+                  <a:alpha val="89000"/>
+                </a:schemeClr>
+              </a:gs>
+            </a:gsLst>
+            <a:lin ang="3000000" scaled="0"/>
+          </a:gradFill>
+          <a:ln>
+            <a:noFill/>
+          </a:ln>
+        </p:spPr>
+        <p:style>
+          <a:lnRef idx="2">
+            <a:schemeClr val="accent1">
+              <a:shade val="50000"/>
+            </a:schemeClr>
+          </a:lnRef>
+          <a:fillRef idx="1">
+            <a:schemeClr val="accent1"/>
+          </a:fillRef>
+          <a:effectRef idx="0">
+            <a:schemeClr val="accent1"/>
+          </a:effectRef>
+          <a:fontRef idx="minor">
+            <a:schemeClr val="lt1"/>
+          </a:fontRef>
+        </p:style>
+        <p:txBody>
+          <a:bodyPr rtlCol="0" anchor="ctr"/>
+          <a:lstStyle/>
+          <a:p>
+            <a:pPr algn="ctr"/>
+            <a:endParaRPr lang="en-US"/>
+          </a:p>
+        </p:txBody>
+      </p:sp>
+      <p:sp>
+        <p:nvSpPr>
+          <p:cNvPr id="13" name="Rectangle 17">
+            <a:extLst>
+              <a:ext uri="{FF2B5EF4-FFF2-40B4-BE49-F238E27FC236}">
+                <a16:creationId xmlns:a16="http://schemas.microsoft.com/office/drawing/2014/main" id="{A2F10B26-073B-4B10-8AAA-161242DD82B0}"/>
+              </a:ext>
+              <a:ext uri="{C183D7F6-B498-43B3-948B-1728B52AA6E4}">
+                <adec:decorative xmlns:adec="http://schemas.microsoft.com/office/drawing/2017/decorative" val="1"/>
+              </a:ext>
+            </a:extLst>
+          </p:cNvPr>
+          <p:cNvSpPr>
+            <a:spLocks noGrp="1" noRot="1" noChangeAspect="1" noMove="1" noResize="1" noEditPoints="1" noAdjustHandles="1" noChangeArrowheads="1" noChangeShapeType="1" noTextEdit="1"/>
+          </p:cNvSpPr>
+          <p:nvPr>
+            <p:extLst>
+              <p:ext uri="{386F3935-93C4-4BCD-93E2-E3B085C9AB24}">
+                <p16:designElem xmlns:p16="http://schemas.microsoft.com/office/powerpoint/2015/main" val="1"/>
+              </p:ext>
+            </p:extLst>
+          </p:nvPr>
+        </p:nvSpPr>
+        <p:spPr>
+          <a:xfrm rot="5400000" flipH="1">
+            <a:off x="-1153806" y="1153804"/>
+            <a:ext cx="6346209" cy="4038601"/>
+          </a:xfrm>
+          <a:prstGeom prst="rect">
+            <a:avLst/>
+          </a:prstGeom>
+          <a:gradFill>
+            <a:gsLst>
+              <a:gs pos="0">
+                <a:schemeClr val="accent5">
+                  <a:lumMod val="60000"/>
+                  <a:lumOff val="40000"/>
+                  <a:alpha val="0"/>
+                </a:schemeClr>
+              </a:gs>
+              <a:gs pos="99000">
+                <a:schemeClr val="accent2">
+                  <a:alpha val="92000"/>
+                </a:schemeClr>
+              </a:gs>
+            </a:gsLst>
+            <a:lin ang="1800000" scaled="0"/>
+          </a:gradFill>
+          <a:ln>
+            <a:noFill/>
+          </a:ln>
+        </p:spPr>
+        <p:style>
+          <a:lnRef idx="2">
+            <a:schemeClr val="accent1">
+              <a:shade val="50000"/>
+            </a:schemeClr>
+          </a:lnRef>
+          <a:fillRef idx="1">
+            <a:schemeClr val="accent1"/>
+          </a:fillRef>
+          <a:effectRef idx="0">
+            <a:schemeClr val="accent1"/>
+          </a:effectRef>
+          <a:fontRef idx="minor">
+            <a:schemeClr val="lt1"/>
+          </a:fontRef>
+        </p:style>
+        <p:txBody>
+          <a:bodyPr rtlCol="0" anchor="ctr"/>
+          <a:lstStyle/>
+          <a:p>
+            <a:pPr algn="ctr"/>
+            <a:endParaRPr lang="en-US"/>
+          </a:p>
+        </p:txBody>
+      </p:sp>
+      <p:sp>
+        <p:nvSpPr>
+          <p:cNvPr id="15" name="Rectangle 19">
+            <a:extLst>
+              <a:ext uri="{FF2B5EF4-FFF2-40B4-BE49-F238E27FC236}">
+                <a16:creationId xmlns:a16="http://schemas.microsoft.com/office/drawing/2014/main" id="{610DBBC7-698F-4A54-B1CB-A99F9CC356DF}"/>
+              </a:ext>
+              <a:ext uri="{C183D7F6-B498-43B3-948B-1728B52AA6E4}">
+                <adec:decorative xmlns:adec="http://schemas.microsoft.com/office/drawing/2017/decorative" val="1"/>
+              </a:ext>
+            </a:extLst>
+          </p:cNvPr>
+          <p:cNvSpPr>
+            <a:spLocks noGrp="1" noRot="1" noChangeAspect="1" noMove="1" noResize="1" noEditPoints="1" noAdjustHandles="1" noChangeArrowheads="1" noChangeShapeType="1" noTextEdit="1"/>
+          </p:cNvSpPr>
+          <p:nvPr>
+            <p:extLst>
+              <p:ext uri="{386F3935-93C4-4BCD-93E2-E3B085C9AB24}">
+                <p16:designElem xmlns:p16="http://schemas.microsoft.com/office/powerpoint/2015/main" val="1"/>
+              </p:ext>
+            </p:extLst>
+          </p:nvPr>
+        </p:nvSpPr>
+        <p:spPr>
+          <a:xfrm rot="5400000" flipH="1">
+            <a:off x="759574" y="3578975"/>
+            <a:ext cx="2502407" cy="4055644"/>
+          </a:xfrm>
+          <a:prstGeom prst="rect">
+            <a:avLst/>
+          </a:prstGeom>
+          <a:gradFill>
+            <a:gsLst>
+              <a:gs pos="2000">
+                <a:schemeClr val="accent5">
+                  <a:alpha val="28000"/>
+                </a:schemeClr>
+              </a:gs>
+              <a:gs pos="100000">
+                <a:schemeClr val="accent4">
+                  <a:alpha val="0"/>
+                </a:schemeClr>
+              </a:gs>
+            </a:gsLst>
+            <a:lin ang="7800000" scaled="0"/>
+          </a:gradFill>
+          <a:ln>
+            <a:noFill/>
+          </a:ln>
+        </p:spPr>
+        <p:style>
+          <a:lnRef idx="2">
+            <a:schemeClr val="accent1">
+              <a:shade val="50000"/>
+            </a:schemeClr>
+          </a:lnRef>
+          <a:fillRef idx="1">
+            <a:schemeClr val="accent1"/>
+          </a:fillRef>
+          <a:effectRef idx="0">
+            <a:schemeClr val="accent1"/>
+          </a:effectRef>
+          <a:fontRef idx="minor">
+            <a:schemeClr val="lt1"/>
+          </a:fontRef>
+        </p:style>
+        <p:txBody>
+          <a:bodyPr rtlCol="0" anchor="ctr"/>
+          <a:lstStyle/>
+          <a:p>
+            <a:pPr algn="ctr"/>
+            <a:endParaRPr lang="en-US"/>
+          </a:p>
+        </p:txBody>
+      </p:sp>
+      <p:sp>
+        <p:nvSpPr>
+          <p:cNvPr id="17" name="Freeform: Shape 21">
+            <a:extLst>
+              <a:ext uri="{FF2B5EF4-FFF2-40B4-BE49-F238E27FC236}">
+                <a16:creationId xmlns:a16="http://schemas.microsoft.com/office/drawing/2014/main" id="{DE6E822A-8BCF-432C-83E6-BBE821476CD4}"/>
+              </a:ext>
+              <a:ext uri="{C183D7F6-B498-43B3-948B-1728B52AA6E4}">
+                <adec:decorative xmlns:adec="http://schemas.microsoft.com/office/drawing/2017/decorative" val="1"/>
+              </a:ext>
+            </a:extLst>
+          </p:cNvPr>
+          <p:cNvSpPr>
+            <a:spLocks noGrp="1" noRot="1" noChangeAspect="1" noMove="1" noResize="1" noEditPoints="1" noAdjustHandles="1" noChangeArrowheads="1" noChangeShapeType="1" noTextEdit="1"/>
+          </p:cNvSpPr>
+          <p:nvPr>
+            <p:extLst>
+              <p:ext uri="{386F3935-93C4-4BCD-93E2-E3B085C9AB24}">
+                <p16:designElem xmlns:p16="http://schemas.microsoft.com/office/powerpoint/2015/main" val="1"/>
+              </p:ext>
+            </p:extLst>
+          </p:nvPr>
+        </p:nvSpPr>
+        <p:spPr>
+          <a:xfrm rot="6097846">
+            <a:off x="-747355" y="1201312"/>
+            <a:ext cx="4808302" cy="4088666"/>
+          </a:xfrm>
+          <a:custGeom>
+            <a:avLst/>
+            <a:gdLst>
+              <a:gd name="connsiteX0" fmla="*/ 48844 w 4808302"/>
+              <a:gd name="connsiteY0" fmla="*/ 2888671 h 4088666"/>
+              <a:gd name="connsiteX1" fmla="*/ 0 w 4808302"/>
+              <a:gd name="connsiteY1" fmla="*/ 2404151 h 4088666"/>
+              <a:gd name="connsiteX2" fmla="*/ 2404151 w 4808302"/>
+              <a:gd name="connsiteY2" fmla="*/ 0 h 4088666"/>
+              <a:gd name="connsiteX3" fmla="*/ 4808302 w 4808302"/>
+              <a:gd name="connsiteY3" fmla="*/ 2404151 h 4088666"/>
+              <a:gd name="connsiteX4" fmla="*/ 4700216 w 4808302"/>
+              <a:gd name="connsiteY4" fmla="*/ 3119072 h 4088666"/>
+              <a:gd name="connsiteX5" fmla="*/ 4643143 w 4808302"/>
+              <a:gd name="connsiteY5" fmla="*/ 3275009 h 4088666"/>
+              <a:gd name="connsiteX6" fmla="*/ 690093 w 4808302"/>
+              <a:gd name="connsiteY6" fmla="*/ 4088666 h 4088666"/>
+              <a:gd name="connsiteX7" fmla="*/ 548991 w 4808302"/>
+              <a:gd name="connsiteY7" fmla="*/ 3933414 h 4088666"/>
+              <a:gd name="connsiteX8" fmla="*/ 48844 w 4808302"/>
+              <a:gd name="connsiteY8" fmla="*/ 2888671 h 4088666"/>
+            </a:gdLst>
+            <a:ahLst/>
+            <a:cxnLst>
+              <a:cxn ang="0">
+                <a:pos x="connsiteX0" y="connsiteY0"/>
+              </a:cxn>
+              <a:cxn ang="0">
+                <a:pos x="connsiteX1" y="connsiteY1"/>
+              </a:cxn>
+              <a:cxn ang="0">
+                <a:pos x="connsiteX2" y="connsiteY2"/>
+              </a:cxn>
+              <a:cxn ang="0">
+                <a:pos x="connsiteX3" y="connsiteY3"/>
+              </a:cxn>
+              <a:cxn ang="0">
+                <a:pos x="connsiteX4" y="connsiteY4"/>
+              </a:cxn>
+              <a:cxn ang="0">
+                <a:pos x="connsiteX5" y="connsiteY5"/>
+              </a:cxn>
+              <a:cxn ang="0">
+                <a:pos x="connsiteX6" y="connsiteY6"/>
+              </a:cxn>
+              <a:cxn ang="0">
+                <a:pos x="connsiteX7" y="connsiteY7"/>
+              </a:cxn>
+              <a:cxn ang="0">
+                <a:pos x="connsiteX8" y="connsiteY8"/>
+              </a:cxn>
+            </a:cxnLst>
+            <a:rect l="l" t="t" r="r" b="b"/>
+            <a:pathLst>
+              <a:path w="4808302" h="4088666">
+                <a:moveTo>
+                  <a:pt x="48844" y="2888671"/>
+                </a:moveTo>
+                <a:cubicBezTo>
+                  <a:pt x="16818" y="2732167"/>
+                  <a:pt x="0" y="2570123"/>
+                  <a:pt x="0" y="2404151"/>
+                </a:cubicBezTo>
+                <a:cubicBezTo>
+                  <a:pt x="0" y="1076375"/>
+                  <a:pt x="1076375" y="0"/>
+                  <a:pt x="2404151" y="0"/>
+                </a:cubicBezTo>
+                <a:cubicBezTo>
+                  <a:pt x="3731927" y="0"/>
+                  <a:pt x="4808302" y="1076375"/>
+                  <a:pt x="4808302" y="2404151"/>
+                </a:cubicBezTo>
+                <a:cubicBezTo>
+                  <a:pt x="4808302" y="2653109"/>
+                  <a:pt x="4770461" y="2893229"/>
+                  <a:pt x="4700216" y="3119072"/>
+                </a:cubicBezTo>
+                <a:lnTo>
+                  <a:pt x="4643143" y="3275009"/>
+                </a:lnTo>
+                <a:lnTo>
+                  <a:pt x="690093" y="4088666"/>
+                </a:lnTo>
+                <a:lnTo>
+                  <a:pt x="548991" y="3933414"/>
+                </a:lnTo>
+                <a:cubicBezTo>
+                  <a:pt x="304015" y="3636572"/>
+                  <a:pt x="128908" y="3279932"/>
+                  <a:pt x="48844" y="2888671"/>
+                </a:cubicBezTo>
+                <a:close/>
+              </a:path>
+            </a:pathLst>
+          </a:custGeom>
+          <a:gradFill>
+            <a:gsLst>
+              <a:gs pos="13000">
+                <a:schemeClr val="accent4">
+                  <a:lumMod val="20000"/>
+                  <a:lumOff val="80000"/>
+                  <a:alpha val="2000"/>
+                </a:schemeClr>
+              </a:gs>
+              <a:gs pos="100000">
+                <a:schemeClr val="accent6">
+                  <a:alpha val="29000"/>
+                </a:schemeClr>
+              </a:gs>
+            </a:gsLst>
+            <a:lin ang="16800000" scaled="0"/>
+          </a:gradFill>
+          <a:ln>
+            <a:noFill/>
+          </a:ln>
+        </p:spPr>
+        <p:style>
+          <a:lnRef idx="2">
+            <a:schemeClr val="accent1">
+              <a:shade val="50000"/>
+            </a:schemeClr>
+          </a:lnRef>
+          <a:fillRef idx="1">
+            <a:schemeClr val="accent1"/>
+          </a:fillRef>
+          <a:effectRef idx="0">
+            <a:schemeClr val="accent1"/>
+          </a:effectRef>
+          <a:fontRef idx="minor">
+            <a:schemeClr val="lt1"/>
+          </a:fontRef>
+        </p:style>
+        <p:txBody>
+          <a:bodyPr wrap="square" rtlCol="0" anchor="ctr">
+            <a:noAutofit/>
+          </a:bodyPr>
+          <a:lstStyle/>
+          <a:p>
+            <a:pPr algn="ctr"/>
+            <a:endParaRPr lang="en-US" dirty="0"/>
+          </a:p>
+        </p:txBody>
+      </p:sp>
+      <p:sp>
+        <p:nvSpPr>
+          <p:cNvPr id="2" name="Title 1">
+            <a:extLst>
+              <a:ext uri="{FF2B5EF4-FFF2-40B4-BE49-F238E27FC236}">
+                <a16:creationId xmlns:a16="http://schemas.microsoft.com/office/drawing/2014/main" id="{3C9D97F6-345F-B17E-756E-3F76D2323271}"/>
+              </a:ext>
+            </a:extLst>
+          </p:cNvPr>
+          <p:cNvSpPr>
+            <a:spLocks noGrp="1"/>
+          </p:cNvSpPr>
+          <p:nvPr>
+            <p:ph type="title"/>
+          </p:nvPr>
+        </p:nvSpPr>
+        <p:spPr>
+          <a:xfrm>
+            <a:off x="474243" y="681317"/>
+            <a:ext cx="3236613" cy="3406187"/>
+          </a:xfrm>
+        </p:spPr>
+        <p:txBody>
+          <a:bodyPr vert="horz" lIns="0" tIns="0" rIns="0" bIns="0" rtlCol="0" anchor="b">
+            <a:normAutofit/>
+          </a:bodyPr>
+          <a:lstStyle/>
+          <a:p>
+            <a:pPr algn="r">
+              <a:lnSpc>
+                <a:spcPct val="90000"/>
+              </a:lnSpc>
+            </a:pPr>
+            <a:r>
+              <a:rPr lang="en-US" sz="1800" spc="750">
+                <a:solidFill>
+                  <a:schemeClr val="bg1"/>
+                </a:solidFill>
+              </a:rPr>
+              <a:t>Neural network architecture </a:t>
+            </a:r>
+            <a:br>
+              <a:rPr lang="en-US" sz="1800" spc="750">
+                <a:solidFill>
+                  <a:schemeClr val="bg1"/>
+                </a:solidFill>
+              </a:rPr>
+            </a:br>
+            <a:br>
+              <a:rPr lang="en-US" sz="1800" spc="750">
+                <a:solidFill>
+                  <a:schemeClr val="bg1"/>
+                </a:solidFill>
+              </a:rPr>
+            </a:br>
+            <a:r>
+              <a:rPr lang="en-US" sz="1800" spc="750">
+                <a:solidFill>
+                  <a:schemeClr val="bg1"/>
+                </a:solidFill>
+              </a:rPr>
+              <a:t>and </a:t>
+            </a:r>
+            <a:br>
+              <a:rPr lang="en-US" sz="1800" spc="750">
+                <a:solidFill>
+                  <a:schemeClr val="bg1"/>
+                </a:solidFill>
+              </a:rPr>
+            </a:br>
+            <a:br>
+              <a:rPr lang="en-US" sz="1800" spc="750">
+                <a:solidFill>
+                  <a:schemeClr val="bg1"/>
+                </a:solidFill>
+              </a:rPr>
+            </a:br>
+            <a:r>
+              <a:rPr lang="en-US" sz="1800" spc="750">
+                <a:solidFill>
+                  <a:schemeClr val="bg1"/>
+                </a:solidFill>
+              </a:rPr>
+              <a:t>hyperparameter experiments</a:t>
+            </a:r>
+          </a:p>
+        </p:txBody>
+      </p:sp>
+    </p:spTree>
+    <p:extLst>
+      <p:ext uri="{BB962C8B-B14F-4D97-AF65-F5344CB8AC3E}">
+        <p14:creationId xmlns:p14="http://schemas.microsoft.com/office/powerpoint/2010/main" val="1830388638"/>
+      </p:ext>
+    </p:extLst>
+  </p:cSld>
+  <p:clrMapOvr>
+    <a:masterClrMapping/>
+  </p:clrMapOvr>
+</p:sld>
+</file>
+
+<file path=ppt/slides/slide35.xml><?xml version="1.0" encoding="utf-8"?>
 <p:sld xmlns:a="http://schemas.openxmlformats.org/drawingml/2006/main" xmlns:r="http://schemas.openxmlformats.org/officeDocument/2006/relationships" xmlns:p="http://schemas.openxmlformats.org/presentationml/2006/main">
   <p:cSld>
     <p:bg>

</xml_diff>